<commit_message>
change style location fix name at pptx file
</commit_message>
<xml_diff>
--- a/JavaScript - Team project.pptx
+++ b/JavaScript - Team project.pptx
@@ -112,7 +112,7 @@
   </p:defaultTextStyle>
   <p:extLst>
     <p:ext uri="{EFAFB233-063F-42B5-8137-9DF3F51BA10A}">
-      <p15:sldGuideLst xmlns:p15="http://schemas.microsoft.com/office/powerpoint/2012/main" xmlns="">
+      <p15:sldGuideLst xmlns="" xmlns:p15="http://schemas.microsoft.com/office/powerpoint/2012/main">
         <p15:guide id="1" orient="horz" pos="2160">
           <p15:clr>
             <a:srgbClr val="A4A3A4"/>
@@ -211,7 +211,7 @@
           <a:p>
             <a:fld id="{79F49AED-2701-4563-8C53-40795C402EBA}" type="datetimeFigureOut">
               <a:rPr lang="en-US" smtClean="0"/>
-              <a:t>7/28/2014</a:t>
+              <a:t>7/29/2014</a:t>
             </a:fld>
             <a:endParaRPr lang="en-US"/>
           </a:p>
@@ -568,7 +568,7 @@
             <a:fld id="{81331B57-0BE5-4F82-AA58-76F53EFF3ADA}" type="datetime8">
               <a:rPr lang="en-US" smtClean="0"/>
               <a:pPr/>
-              <a:t>7/28/2014 11:46 PM</a:t>
+              <a:t>7/29/2014 8:36 PM</a:t>
             </a:fld>
             <a:endParaRPr lang="en-US" dirty="0"/>
           </a:p>
@@ -4099,19 +4099,7 @@
             <a:pPr algn="ctr"/>
             <a:r>
               <a:rPr lang="en-US" dirty="0" smtClean="0"/>
-              <a:t>Java </a:t>
-            </a:r>
-            <a:r>
-              <a:rPr lang="en-US" dirty="0" smtClean="0"/>
-              <a:t>Script</a:t>
-            </a:r>
-            <a:r>
-              <a:rPr lang="en-US" dirty="0" smtClean="0"/>
-              <a:t> </a:t>
-            </a:r>
-            <a:r>
-              <a:rPr lang="en-US" dirty="0" smtClean="0"/>
-              <a:t>- Team project</a:t>
+              <a:t>Java Script - Team project</a:t>
             </a:r>
             <a:br>
               <a:rPr lang="en-US" dirty="0" smtClean="0"/>
@@ -4168,11 +4156,7 @@
             </a:r>
             <a:r>
               <a:rPr lang="en-US" sz="5200" dirty="0" smtClean="0"/>
-              <a:t>Team </a:t>
-            </a:r>
-            <a:r>
-              <a:rPr lang="en-US" sz="5200" dirty="0" smtClean="0"/>
-              <a:t>“</a:t>
+              <a:t>Team “</a:t>
             </a:r>
             <a:r>
               <a:rPr lang="en-US" sz="5200" b="1" cap="all" dirty="0"/>
@@ -4182,7 +4166,6 @@
               <a:rPr lang="en-US" sz="5200" dirty="0" smtClean="0"/>
               <a:t>”</a:t>
             </a:r>
-            <a:endParaRPr lang="en-US" sz="5200" dirty="0" smtClean="0"/>
           </a:p>
           <a:p>
             <a:endParaRPr lang="en-US" dirty="0" smtClean="0"/>
@@ -4455,11 +4438,7 @@
           <a:p>
             <a:r>
               <a:rPr lang="en-US" dirty="0" smtClean="0"/>
-              <a:t>Team </a:t>
-            </a:r>
-            <a:r>
-              <a:rPr lang="en-US" dirty="0" smtClean="0"/>
-              <a:t>“</a:t>
+              <a:t>Team “</a:t>
             </a:r>
             <a:r>
               <a:rPr lang="en-US" b="1" cap="all" dirty="0">
@@ -4662,11 +4641,7 @@
             </a:pPr>
             <a:r>
               <a:rPr lang="en-US" sz="3600" dirty="0" smtClean="0"/>
-              <a:t>The Players</a:t>
-            </a:r>
-            <a:r>
-              <a:rPr lang="en-US" sz="3600" dirty="0" smtClean="0"/>
-              <a:t>:</a:t>
+              <a:t>The Players:</a:t>
             </a:r>
             <a:endParaRPr lang="bg-BG" sz="3600" dirty="0" smtClean="0"/>
           </a:p>
@@ -4678,9 +4653,14 @@
           </a:p>
           <a:p>
             <a:r>
-              <a:rPr lang="bg-BG" sz="3600" dirty="0" smtClean="0"/>
-              <a:t>Мартин Цветков</a:t>
-            </a:r>
+              <a:rPr lang="bg-BG" sz="3600" smtClean="0"/>
+              <a:t>Мартин </a:t>
+            </a:r>
+            <a:r>
+              <a:rPr lang="bg-BG" sz="3600" smtClean="0"/>
+              <a:t>Цеков</a:t>
+            </a:r>
+            <a:endParaRPr lang="bg-BG" sz="3600" dirty="0" smtClean="0"/>
           </a:p>
           <a:p>
             <a:r>

</xml_diff>

<commit_message>
added JavaScript - Team project.pptx
</commit_message>
<xml_diff>
--- a/JavaScript - Team project.pptx
+++ b/JavaScript - Team project.pptx
@@ -6,12 +6,14 @@
     <p:sldMasterId id="2147483673" r:id="rId3"/>
   </p:sldMasterIdLst>
   <p:notesMasterIdLst>
-    <p:notesMasterId r:id="rId7"/>
+    <p:notesMasterId r:id="rId9"/>
   </p:notesMasterIdLst>
   <p:sldIdLst>
     <p:sldId id="257" r:id="rId4"/>
     <p:sldId id="260" r:id="rId5"/>
     <p:sldId id="262" r:id="rId6"/>
+    <p:sldId id="263" r:id="rId7"/>
+    <p:sldId id="264" r:id="rId8"/>
   </p:sldIdLst>
   <p:sldSz cx="9144000" cy="6858000" type="screen4x3"/>
   <p:notesSz cx="6858000" cy="9144000"/>
@@ -112,7 +114,7 @@
   </p:defaultTextStyle>
   <p:extLst>
     <p:ext uri="{EFAFB233-063F-42B5-8137-9DF3F51BA10A}">
-      <p15:sldGuideLst xmlns="" xmlns:p15="http://schemas.microsoft.com/office/powerpoint/2012/main">
+      <p15:sldGuideLst xmlns:p15="http://schemas.microsoft.com/office/powerpoint/2012/main" xmlns="">
         <p15:guide id="1" orient="horz" pos="2160">
           <p15:clr>
             <a:srgbClr val="A4A3A4"/>
@@ -211,7 +213,7 @@
           <a:p>
             <a:fld id="{79F49AED-2701-4563-8C53-40795C402EBA}" type="datetimeFigureOut">
               <a:rPr lang="en-US" smtClean="0"/>
-              <a:t>7/29/2014</a:t>
+              <a:t>7/30/2014</a:t>
             </a:fld>
             <a:endParaRPr lang="en-US"/>
           </a:p>
@@ -568,7 +570,7 @@
             <a:fld id="{81331B57-0BE5-4F82-AA58-76F53EFF3ADA}" type="datetime8">
               <a:rPr lang="en-US" smtClean="0"/>
               <a:pPr/>
-              <a:t>7/29/2014 8:36 PM</a:t>
+              <a:t>7/30/2014 12:17 PM</a:t>
             </a:fld>
             <a:endParaRPr lang="en-US" dirty="0"/>
           </a:p>
@@ -4654,11 +4656,7 @@
           <a:p>
             <a:r>
               <a:rPr lang="bg-BG" sz="3600" smtClean="0"/>
-              <a:t>Мартин </a:t>
-            </a:r>
-            <a:r>
-              <a:rPr lang="bg-BG" sz="3600" smtClean="0"/>
-              <a:t>Цеков</a:t>
+              <a:t>Мартин Цеков</a:t>
             </a:r>
             <a:endParaRPr lang="bg-BG" sz="3600" dirty="0" smtClean="0"/>
           </a:p>
@@ -5757,7 +5755,15 @@
           <a:p>
             <a:r>
               <a:rPr lang="en-US" sz="3000" dirty="0" smtClean="0"/>
-              <a:t>	Object you = BLACKJACK.PLAYER;</a:t>
+              <a:t>	</a:t>
+            </a:r>
+            <a:r>
+              <a:rPr lang="en-US" sz="3000" dirty="0" smtClean="0"/>
+              <a:t>Object </a:t>
+            </a:r>
+            <a:r>
+              <a:rPr lang="en-US" sz="3000" dirty="0" smtClean="0"/>
+              <a:t>you = BLACKJACK.PLAYER;</a:t>
             </a:r>
           </a:p>
           <a:p>
@@ -6338,6 +6344,357 @@
       <p:bldP spid="7" grpId="0"/>
     </p:bldLst>
   </p:timing>
+</p:sld>
+</file>
+
+<file path=ppt/slides/slide4.xml><?xml version="1.0" encoding="utf-8"?>
+<p:sld xmlns:a="http://schemas.openxmlformats.org/drawingml/2006/main" xmlns:r="http://schemas.openxmlformats.org/officeDocument/2006/relationships" xmlns:p="http://schemas.openxmlformats.org/presentationml/2006/main">
+  <p:cSld>
+    <p:spTree>
+      <p:nvGrpSpPr>
+        <p:cNvPr id="1" name=""/>
+        <p:cNvGrpSpPr/>
+        <p:nvPr/>
+      </p:nvGrpSpPr>
+      <p:grpSpPr>
+        <a:xfrm>
+          <a:off x="0" y="0"/>
+          <a:ext cx="0" cy="0"/>
+          <a:chOff x="0" y="0"/>
+          <a:chExt cx="0" cy="0"/>
+        </a:xfrm>
+      </p:grpSpPr>
+      <p:sp>
+        <p:nvSpPr>
+          <p:cNvPr id="2" name="Title 1"/>
+          <p:cNvSpPr>
+            <a:spLocks noGrp="1"/>
+          </p:cNvSpPr>
+          <p:nvPr>
+            <p:ph type="title"/>
+          </p:nvPr>
+        </p:nvSpPr>
+        <p:spPr>
+          <a:xfrm>
+            <a:off x="381000" y="230188"/>
+            <a:ext cx="8382000" cy="1938992"/>
+          </a:xfrm>
+        </p:spPr>
+        <p:txBody>
+          <a:bodyPr/>
+          <a:lstStyle/>
+          <a:p>
+            <a:r>
+              <a:rPr lang="en-US" sz="2800" b="1" dirty="0" smtClean="0">
+                <a:effectLst/>
+              </a:rPr>
+              <a:t>	Blackjack</a:t>
+            </a:r>
+            <a:r>
+              <a:rPr lang="en-US" sz="2800" dirty="0">
+                <a:effectLst/>
+              </a:rPr>
+              <a:t>, also known as </a:t>
+            </a:r>
+            <a:r>
+              <a:rPr lang="en-US" sz="2800" b="1" dirty="0">
+                <a:effectLst/>
+              </a:rPr>
+              <a:t>twenty-one</a:t>
+            </a:r>
+            <a:r>
+              <a:rPr lang="en-US" sz="2800" dirty="0">
+                <a:effectLst/>
+              </a:rPr>
+              <a:t>, is the most widely played </a:t>
+            </a:r>
+            <a:r>
+              <a:rPr lang="en-US" sz="2800" dirty="0" smtClean="0">
+                <a:effectLst/>
+              </a:rPr>
+              <a:t> casino</a:t>
+            </a:r>
+            <a:r>
+              <a:rPr lang="en-US" sz="2800" dirty="0">
+                <a:effectLst/>
+              </a:rPr>
+              <a:t> </a:t>
+            </a:r>
+            <a:r>
+              <a:rPr lang="en-US" sz="2800" dirty="0" smtClean="0">
+                <a:effectLst/>
+              </a:rPr>
+              <a:t> banking </a:t>
+            </a:r>
+            <a:r>
+              <a:rPr lang="en-US" sz="2800" dirty="0">
+                <a:effectLst/>
+              </a:rPr>
+              <a:t>game in the </a:t>
+            </a:r>
+            <a:r>
+              <a:rPr lang="en-US" sz="2800" dirty="0" smtClean="0">
+                <a:effectLst/>
+              </a:rPr>
+              <a:t>world. Blackjack  </a:t>
+            </a:r>
+            <a:r>
+              <a:rPr lang="en-US" sz="2800" dirty="0">
+                <a:effectLst/>
+              </a:rPr>
+              <a:t>is </a:t>
+            </a:r>
+            <a:r>
+              <a:rPr lang="en-US" sz="2800" dirty="0" smtClean="0">
+                <a:effectLst/>
+              </a:rPr>
+              <a:t> a </a:t>
+            </a:r>
+            <a:r>
+              <a:rPr lang="en-US" sz="2800" dirty="0">
+                <a:effectLst/>
+              </a:rPr>
+              <a:t>comparing </a:t>
+            </a:r>
+            <a:r>
+              <a:rPr lang="en-US" sz="2800" dirty="0" smtClean="0">
+                <a:effectLst/>
+              </a:rPr>
+              <a:t> card game  between </a:t>
+            </a:r>
+            <a:r>
+              <a:rPr lang="en-US" sz="2800" dirty="0">
+                <a:effectLst/>
+              </a:rPr>
+              <a:t>a player and dealer, </a:t>
+            </a:r>
+            <a:r>
+              <a:rPr lang="en-US" sz="2800" dirty="0" smtClean="0">
+                <a:effectLst/>
+              </a:rPr>
+              <a:t> meaning  that </a:t>
+            </a:r>
+            <a:r>
+              <a:rPr lang="en-US" sz="2800" dirty="0">
+                <a:effectLst/>
+              </a:rPr>
+              <a:t>players compete </a:t>
+            </a:r>
+            <a:r>
+              <a:rPr lang="en-US" sz="2800" dirty="0" smtClean="0">
+                <a:effectLst/>
+              </a:rPr>
+              <a:t> against  the </a:t>
+            </a:r>
+            <a:r>
+              <a:rPr lang="en-US" sz="2800" dirty="0">
+                <a:effectLst/>
+              </a:rPr>
+              <a:t>dealer but not against any other players. </a:t>
+            </a:r>
+            <a:r>
+              <a:rPr lang="en-US" sz="2800" dirty="0" smtClean="0">
+                <a:effectLst/>
+              </a:rPr>
+              <a:t> It </a:t>
+            </a:r>
+            <a:r>
+              <a:rPr lang="en-US" sz="2800" dirty="0">
+                <a:effectLst/>
+              </a:rPr>
+              <a:t>is played with one or more </a:t>
+            </a:r>
+            <a:r>
+              <a:rPr lang="en-US" sz="2800" dirty="0" smtClean="0">
+                <a:effectLst/>
+              </a:rPr>
+              <a:t> decks  of  52 </a:t>
+            </a:r>
+            <a:r>
+              <a:rPr lang="en-US" sz="2800" dirty="0">
+                <a:effectLst/>
+              </a:rPr>
+              <a:t>cards. </a:t>
+            </a:r>
+            <a:endParaRPr lang="en-US" sz="2800" dirty="0"/>
+          </a:p>
+        </p:txBody>
+      </p:sp>
+      <p:pic>
+        <p:nvPicPr>
+          <p:cNvPr id="3" name="Picture 2"/>
+          <p:cNvPicPr>
+            <a:picLocks noChangeAspect="1"/>
+          </p:cNvPicPr>
+          <p:nvPr/>
+        </p:nvPicPr>
+        <p:blipFill>
+          <a:blip r:embed="rId2">
+            <a:extLst>
+              <a:ext uri="{28A0092B-C50C-407E-A947-70E740481C1C}">
+                <a14:useLocalDpi xmlns:a14="http://schemas.microsoft.com/office/drawing/2010/main" val="0"/>
+              </a:ext>
+            </a:extLst>
+          </a:blip>
+          <a:stretch>
+            <a:fillRect/>
+          </a:stretch>
+        </p:blipFill>
+        <p:spPr>
+          <a:xfrm>
+            <a:off x="1619672" y="2642112"/>
+            <a:ext cx="5829555" cy="3879304"/>
+          </a:xfrm>
+          <a:prstGeom prst="rect">
+            <a:avLst/>
+          </a:prstGeom>
+        </p:spPr>
+      </p:pic>
+    </p:spTree>
+    <p:extLst>
+      <p:ext uri="{BB962C8B-B14F-4D97-AF65-F5344CB8AC3E}">
+        <p14:creationId xmlns:p14="http://schemas.microsoft.com/office/powerpoint/2010/main" val="2110692023"/>
+      </p:ext>
+    </p:extLst>
+  </p:cSld>
+  <p:clrMapOvr>
+    <a:masterClrMapping/>
+  </p:clrMapOvr>
+  <p:transition>
+    <p:fade/>
+  </p:transition>
+</p:sld>
+</file>
+
+<file path=ppt/slides/slide5.xml><?xml version="1.0" encoding="utf-8"?>
+<p:sld xmlns:a="http://schemas.openxmlformats.org/drawingml/2006/main" xmlns:r="http://schemas.openxmlformats.org/officeDocument/2006/relationships" xmlns:p="http://schemas.openxmlformats.org/presentationml/2006/main">
+  <p:cSld>
+    <p:spTree>
+      <p:nvGrpSpPr>
+        <p:cNvPr id="1" name=""/>
+        <p:cNvGrpSpPr/>
+        <p:nvPr/>
+      </p:nvGrpSpPr>
+      <p:grpSpPr>
+        <a:xfrm>
+          <a:off x="0" y="0"/>
+          <a:ext cx="0" cy="0"/>
+          <a:chOff x="0" y="0"/>
+          <a:chExt cx="0" cy="0"/>
+        </a:xfrm>
+      </p:grpSpPr>
+      <p:sp>
+        <p:nvSpPr>
+          <p:cNvPr id="2" name="Title 1"/>
+          <p:cNvSpPr>
+            <a:spLocks noGrp="1"/>
+          </p:cNvSpPr>
+          <p:nvPr>
+            <p:ph type="title"/>
+          </p:nvPr>
+        </p:nvSpPr>
+        <p:spPr>
+          <a:xfrm>
+            <a:off x="0" y="908720"/>
+            <a:ext cx="8382000" cy="914096"/>
+          </a:xfrm>
+        </p:spPr>
+        <p:txBody>
+          <a:bodyPr/>
+          <a:lstStyle/>
+          <a:p>
+            <a:r>
+              <a:rPr lang="en-US" sz="6600" dirty="0">
+                <a:solidFill>
+                  <a:srgbClr val="FFC000"/>
+                </a:solidFill>
+              </a:rPr>
+              <a:t>What is the game?</a:t>
+            </a:r>
+          </a:p>
+        </p:txBody>
+      </p:sp>
+      <p:sp>
+        <p:nvSpPr>
+          <p:cNvPr id="4" name="Rectangle 3"/>
+          <p:cNvSpPr/>
+          <p:nvPr/>
+        </p:nvSpPr>
+        <p:spPr>
+          <a:xfrm>
+            <a:off x="4716016" y="5373216"/>
+            <a:ext cx="4248472" cy="1015663"/>
+          </a:xfrm>
+          <a:prstGeom prst="rect">
+            <a:avLst/>
+          </a:prstGeom>
+        </p:spPr>
+        <p:txBody>
+          <a:bodyPr wrap="square">
+            <a:spAutoFit/>
+          </a:bodyPr>
+          <a:lstStyle/>
+          <a:p>
+            <a:pPr algn="r"/>
+            <a:r>
+              <a:rPr lang="en-US" sz="6000" dirty="0">
+                <a:solidFill>
+                  <a:srgbClr val="FFC000"/>
+                </a:solidFill>
+              </a:rPr>
+              <a:t>let see it….</a:t>
+            </a:r>
+            <a:endParaRPr lang="en-US" sz="6000" dirty="0">
+              <a:solidFill>
+                <a:srgbClr val="FFC000"/>
+              </a:solidFill>
+            </a:endParaRPr>
+          </a:p>
+        </p:txBody>
+      </p:sp>
+      <p:pic>
+        <p:nvPicPr>
+          <p:cNvPr id="5" name="Picture 4"/>
+          <p:cNvPicPr>
+            <a:picLocks noChangeAspect="1"/>
+          </p:cNvPicPr>
+          <p:nvPr/>
+        </p:nvPicPr>
+        <p:blipFill>
+          <a:blip r:embed="rId2">
+            <a:extLst>
+              <a:ext uri="{28A0092B-C50C-407E-A947-70E740481C1C}">
+                <a14:useLocalDpi xmlns:a14="http://schemas.microsoft.com/office/drawing/2010/main" val="0"/>
+              </a:ext>
+            </a:extLst>
+          </a:blip>
+          <a:stretch>
+            <a:fillRect/>
+          </a:stretch>
+        </p:blipFill>
+        <p:spPr>
+          <a:xfrm>
+            <a:off x="179512" y="188640"/>
+            <a:ext cx="2160240" cy="550649"/>
+          </a:xfrm>
+          <a:prstGeom prst="rect">
+            <a:avLst/>
+          </a:prstGeom>
+        </p:spPr>
+      </p:pic>
+    </p:spTree>
+    <p:extLst>
+      <p:ext uri="{BB962C8B-B14F-4D97-AF65-F5344CB8AC3E}">
+        <p14:creationId xmlns:p14="http://schemas.microsoft.com/office/powerpoint/2010/main" val="1247888144"/>
+      </p:ext>
+    </p:extLst>
+  </p:cSld>
+  <p:clrMapOvr>
+    <a:masterClrMapping/>
+  </p:clrMapOvr>
+  <p:transition>
+    <p:fade/>
+  </p:transition>
 </p:sld>
 </file>
 

</xml_diff>